<commit_message>
update module 3 slides
</commit_message>
<xml_diff>
--- a/Slides/MVA-What'sNewC#6-Module2.pptx
+++ b/Slides/MVA-What'sNewC#6-Module2.pptx
@@ -6,10 +6,10 @@
     <p:sldMasterId id="2147483861" r:id="rId5"/>
   </p:sldMasterIdLst>
   <p:notesMasterIdLst>
-    <p:notesMasterId r:id="rId19"/>
+    <p:notesMasterId r:id="rId20"/>
   </p:notesMasterIdLst>
   <p:handoutMasterIdLst>
-    <p:handoutMasterId r:id="rId20"/>
+    <p:handoutMasterId r:id="rId21"/>
   </p:handoutMasterIdLst>
   <p:sldIdLst>
     <p:sldId id="286" r:id="rId6"/>
@@ -24,7 +24,8 @@
     <p:sldId id="267" r:id="rId15"/>
     <p:sldId id="292" r:id="rId16"/>
     <p:sldId id="293" r:id="rId17"/>
-    <p:sldId id="289" r:id="rId18"/>
+    <p:sldId id="294" r:id="rId18"/>
+    <p:sldId id="289" r:id="rId19"/>
   </p:sldIdLst>
   <p:sldSz cx="12188825" cy="6858000"/>
   <p:notesSz cx="6858000" cy="9144000"/>
@@ -1091,6 +1092,91 @@
     <p:extLst>
       <p:ext uri="{BB962C8B-B14F-4D97-AF65-F5344CB8AC3E}">
         <p14:creationId xmlns:p14="http://schemas.microsoft.com/office/powerpoint/2010/main" val="3581266726"/>
+      </p:ext>
+    </p:extLst>
+  </p:cSld>
+  <p:clrMapOvr>
+    <a:masterClrMapping/>
+  </p:clrMapOvr>
+</p:notes>
+</file>
+
+<file path=ppt/notesSlides/notesSlide11.xml><?xml version="1.0" encoding="utf-8"?>
+<p:notes xmlns:a="http://schemas.openxmlformats.org/drawingml/2006/main" xmlns:r="http://schemas.openxmlformats.org/officeDocument/2006/relationships" xmlns:p="http://schemas.openxmlformats.org/presentationml/2006/main">
+  <p:cSld>
+    <p:spTree>
+      <p:nvGrpSpPr>
+        <p:cNvPr id="1" name=""/>
+        <p:cNvGrpSpPr/>
+        <p:nvPr/>
+      </p:nvGrpSpPr>
+      <p:grpSpPr>
+        <a:xfrm>
+          <a:off x="0" y="0"/>
+          <a:ext cx="0" cy="0"/>
+          <a:chOff x="0" y="0"/>
+          <a:chExt cx="0" cy="0"/>
+        </a:xfrm>
+      </p:grpSpPr>
+      <p:sp>
+        <p:nvSpPr>
+          <p:cNvPr id="2" name="Slide Image Placeholder 1"/>
+          <p:cNvSpPr>
+            <a:spLocks noGrp="1" noRot="1" noChangeAspect="1"/>
+          </p:cNvSpPr>
+          <p:nvPr>
+            <p:ph type="sldImg"/>
+          </p:nvPr>
+        </p:nvSpPr>
+        <p:spPr/>
+      </p:sp>
+      <p:sp>
+        <p:nvSpPr>
+          <p:cNvPr id="3" name="Notes Placeholder 2"/>
+          <p:cNvSpPr>
+            <a:spLocks noGrp="1"/>
+          </p:cNvSpPr>
+          <p:nvPr>
+            <p:ph type="body" idx="1"/>
+          </p:nvPr>
+        </p:nvSpPr>
+        <p:spPr/>
+        <p:txBody>
+          <a:bodyPr/>
+          <a:lstStyle/>
+          <a:p>
+            <a:endParaRPr lang="en-US" dirty="0"/>
+          </a:p>
+        </p:txBody>
+      </p:sp>
+      <p:sp>
+        <p:nvSpPr>
+          <p:cNvPr id="4" name="Slide Number Placeholder 3"/>
+          <p:cNvSpPr>
+            <a:spLocks noGrp="1"/>
+          </p:cNvSpPr>
+          <p:nvPr>
+            <p:ph type="sldNum" sz="quarter" idx="10"/>
+          </p:nvPr>
+        </p:nvSpPr>
+        <p:spPr/>
+        <p:txBody>
+          <a:bodyPr/>
+          <a:lstStyle/>
+          <a:p>
+            <a:fld id="{8B263312-38AA-4E1E-B2B5-0F8F122B24FE}" type="slidenum">
+              <a:rPr lang="en-US" smtClean="0"/>
+              <a:pPr/>
+              <a:t>13</a:t>
+            </a:fld>
+            <a:endParaRPr lang="en-US" dirty="0"/>
+          </a:p>
+        </p:txBody>
+      </p:sp>
+    </p:spTree>
+    <p:extLst>
+      <p:ext uri="{BB962C8B-B14F-4D97-AF65-F5344CB8AC3E}">
+        <p14:creationId xmlns:p14="http://schemas.microsoft.com/office/powerpoint/2010/main" val="813626479"/>
       </p:ext>
     </p:extLst>
   </p:cSld>
@@ -8554,7 +8640,7 @@
           </a:p>
           <a:p>
             <a:r>
-              <a:rPr lang="en-US" smtClean="0"/>
+              <a:rPr lang="en-US" dirty="0" smtClean="0"/>
               <a:t>Dictionary Initializers</a:t>
             </a:r>
             <a:endParaRPr lang="en-US" dirty="0"/>
@@ -8608,6 +8694,1065 @@
 </file>
 
 <file path=ppt/slides/slide13.xml><?xml version="1.0" encoding="utf-8"?>
+<p:sld xmlns:a="http://schemas.openxmlformats.org/drawingml/2006/main" xmlns:r="http://schemas.openxmlformats.org/officeDocument/2006/relationships" xmlns:p="http://schemas.openxmlformats.org/presentationml/2006/main">
+  <p:cSld>
+    <p:spTree>
+      <p:nvGrpSpPr>
+        <p:cNvPr id="1" name=""/>
+        <p:cNvGrpSpPr/>
+        <p:nvPr/>
+      </p:nvGrpSpPr>
+      <p:grpSpPr>
+        <a:xfrm>
+          <a:off x="0" y="0"/>
+          <a:ext cx="0" cy="0"/>
+          <a:chOff x="0" y="0"/>
+          <a:chExt cx="0" cy="0"/>
+        </a:xfrm>
+      </p:grpSpPr>
+      <p:sp>
+        <p:nvSpPr>
+          <p:cNvPr id="5" name="Title 4"/>
+          <p:cNvSpPr>
+            <a:spLocks noGrp="1"/>
+          </p:cNvSpPr>
+          <p:nvPr>
+            <p:ph type="title"/>
+          </p:nvPr>
+        </p:nvSpPr>
+        <p:spPr/>
+        <p:txBody>
+          <a:bodyPr/>
+          <a:lstStyle/>
+          <a:p>
+            <a:r>
+              <a:rPr lang="en-US" dirty="0" smtClean="0"/>
+              <a:t>Features for Data Transfer Objects</a:t>
+            </a:r>
+            <a:endParaRPr lang="en-US" dirty="0"/>
+          </a:p>
+        </p:txBody>
+      </p:sp>
+      <p:sp>
+        <p:nvSpPr>
+          <p:cNvPr id="7" name="Content Placeholder 5"/>
+          <p:cNvSpPr>
+            <a:spLocks noGrp="1"/>
+          </p:cNvSpPr>
+          <p:nvPr>
+            <p:ph sz="quarter" idx="4294967295"/>
+          </p:nvPr>
+        </p:nvSpPr>
+        <p:spPr>
+          <a:xfrm>
+            <a:off x="291101" y="1363286"/>
+            <a:ext cx="4251960" cy="3429000"/>
+          </a:xfrm>
+          <a:prstGeom prst="rect">
+            <a:avLst/>
+          </a:prstGeom>
+        </p:spPr>
+        <p:txBody>
+          <a:bodyPr>
+            <a:noAutofit/>
+          </a:bodyPr>
+          <a:lstStyle/>
+          <a:p>
+            <a:pPr marL="0" marR="0" indent="0">
+              <a:lnSpc>
+                <a:spcPct val="107000"/>
+              </a:lnSpc>
+              <a:spcBef>
+                <a:spcPts val="0"/>
+              </a:spcBef>
+              <a:spcAft>
+                <a:spcPts val="0"/>
+              </a:spcAft>
+              <a:buNone/>
+            </a:pPr>
+            <a:r>
+              <a:rPr lang="en-US" sz="1600" dirty="0">
+                <a:solidFill>
+                  <a:srgbClr val="0000FF"/>
+                </a:solidFill>
+                <a:latin typeface="Consolas" panose="020B0609020204030204" pitchFamily="49" charset="0"/>
+                <a:ea typeface="Calibri" panose="020F0502020204030204" pitchFamily="34" charset="0"/>
+                <a:cs typeface="Consolas" panose="020B0609020204030204" pitchFamily="49" charset="0"/>
+              </a:rPr>
+              <a:t>public</a:t>
+            </a:r>
+            <a:r>
+              <a:rPr lang="en-US" sz="1600" dirty="0">
+                <a:solidFill>
+                  <a:srgbClr val="000000"/>
+                </a:solidFill>
+                <a:latin typeface="Consolas" panose="020B0609020204030204" pitchFamily="49" charset="0"/>
+                <a:ea typeface="Calibri" panose="020F0502020204030204" pitchFamily="34" charset="0"/>
+                <a:cs typeface="Consolas" panose="020B0609020204030204" pitchFamily="49" charset="0"/>
+              </a:rPr>
+              <a:t> </a:t>
+            </a:r>
+            <a:r>
+              <a:rPr lang="en-US" sz="1600" dirty="0">
+                <a:solidFill>
+                  <a:srgbClr val="0000FF"/>
+                </a:solidFill>
+                <a:latin typeface="Consolas" panose="020B0609020204030204" pitchFamily="49" charset="0"/>
+                <a:ea typeface="Calibri" panose="020F0502020204030204" pitchFamily="34" charset="0"/>
+                <a:cs typeface="Consolas" panose="020B0609020204030204" pitchFamily="49" charset="0"/>
+              </a:rPr>
+              <a:t>class</a:t>
+            </a:r>
+            <a:r>
+              <a:rPr lang="en-US" sz="1600" dirty="0">
+                <a:solidFill>
+                  <a:srgbClr val="000000"/>
+                </a:solidFill>
+                <a:latin typeface="Consolas" panose="020B0609020204030204" pitchFamily="49" charset="0"/>
+                <a:ea typeface="Calibri" panose="020F0502020204030204" pitchFamily="34" charset="0"/>
+                <a:cs typeface="Consolas" panose="020B0609020204030204" pitchFamily="49" charset="0"/>
+              </a:rPr>
+              <a:t> </a:t>
+            </a:r>
+            <a:r>
+              <a:rPr lang="en-US" sz="1600" dirty="0">
+                <a:solidFill>
+                  <a:srgbClr val="2B91AF"/>
+                </a:solidFill>
+                <a:latin typeface="Consolas" panose="020B0609020204030204" pitchFamily="49" charset="0"/>
+                <a:ea typeface="Calibri" panose="020F0502020204030204" pitchFamily="34" charset="0"/>
+                <a:cs typeface="Consolas" panose="020B0609020204030204" pitchFamily="49" charset="0"/>
+              </a:rPr>
+              <a:t>Point</a:t>
+            </a:r>
+            <a:endParaRPr lang="en-US" sz="1600" dirty="0">
+              <a:latin typeface="Consolas" panose="020B0609020204030204" pitchFamily="49" charset="0"/>
+              <a:ea typeface="Calibri" panose="020F0502020204030204" pitchFamily="34" charset="0"/>
+              <a:cs typeface="Consolas" panose="020B0609020204030204" pitchFamily="49" charset="0"/>
+            </a:endParaRPr>
+          </a:p>
+          <a:p>
+            <a:pPr marL="0" marR="0" indent="0">
+              <a:lnSpc>
+                <a:spcPct val="107000"/>
+              </a:lnSpc>
+              <a:spcBef>
+                <a:spcPts val="0"/>
+              </a:spcBef>
+              <a:spcAft>
+                <a:spcPts val="0"/>
+              </a:spcAft>
+              <a:buNone/>
+            </a:pPr>
+            <a:r>
+              <a:rPr lang="en-US" sz="1600" dirty="0">
+                <a:solidFill>
+                  <a:srgbClr val="000000"/>
+                </a:solidFill>
+                <a:latin typeface="Consolas" panose="020B0609020204030204" pitchFamily="49" charset="0"/>
+                <a:ea typeface="Calibri" panose="020F0502020204030204" pitchFamily="34" charset="0"/>
+                <a:cs typeface="Consolas" panose="020B0609020204030204" pitchFamily="49" charset="0"/>
+              </a:rPr>
+              <a:t>{</a:t>
+            </a:r>
+            <a:endParaRPr lang="en-US" sz="1600" dirty="0">
+              <a:latin typeface="Consolas" panose="020B0609020204030204" pitchFamily="49" charset="0"/>
+              <a:ea typeface="Calibri" panose="020F0502020204030204" pitchFamily="34" charset="0"/>
+              <a:cs typeface="Consolas" panose="020B0609020204030204" pitchFamily="49" charset="0"/>
+            </a:endParaRPr>
+          </a:p>
+          <a:p>
+            <a:pPr marL="0" marR="0" indent="0">
+              <a:lnSpc>
+                <a:spcPct val="107000"/>
+              </a:lnSpc>
+              <a:spcBef>
+                <a:spcPts val="0"/>
+              </a:spcBef>
+              <a:spcAft>
+                <a:spcPts val="0"/>
+              </a:spcAft>
+              <a:buNone/>
+            </a:pPr>
+            <a:r>
+              <a:rPr lang="en-US" sz="1600" dirty="0" smtClean="0">
+                <a:solidFill>
+                  <a:srgbClr val="000000"/>
+                </a:solidFill>
+                <a:latin typeface="Consolas" panose="020B0609020204030204" pitchFamily="49" charset="0"/>
+                <a:ea typeface="Calibri" panose="020F0502020204030204" pitchFamily="34" charset="0"/>
+                <a:cs typeface="Consolas" panose="020B0609020204030204" pitchFamily="49" charset="0"/>
+              </a:rPr>
+              <a:t>  </a:t>
+            </a:r>
+            <a:r>
+              <a:rPr lang="en-US" sz="1600" dirty="0">
+                <a:solidFill>
+                  <a:srgbClr val="0000FF"/>
+                </a:solidFill>
+                <a:latin typeface="Consolas" panose="020B0609020204030204" pitchFamily="49" charset="0"/>
+                <a:ea typeface="Calibri" panose="020F0502020204030204" pitchFamily="34" charset="0"/>
+                <a:cs typeface="Consolas" panose="020B0609020204030204" pitchFamily="49" charset="0"/>
+              </a:rPr>
+              <a:t>public</a:t>
+            </a:r>
+            <a:r>
+              <a:rPr lang="en-US" sz="1600" dirty="0">
+                <a:solidFill>
+                  <a:srgbClr val="000000"/>
+                </a:solidFill>
+                <a:latin typeface="Consolas" panose="020B0609020204030204" pitchFamily="49" charset="0"/>
+                <a:ea typeface="Calibri" panose="020F0502020204030204" pitchFamily="34" charset="0"/>
+                <a:cs typeface="Consolas" panose="020B0609020204030204" pitchFamily="49" charset="0"/>
+              </a:rPr>
+              <a:t> Point(</a:t>
+            </a:r>
+            <a:r>
+              <a:rPr lang="en-US" sz="1600" dirty="0">
+                <a:solidFill>
+                  <a:srgbClr val="0000FF"/>
+                </a:solidFill>
+                <a:latin typeface="Consolas" panose="020B0609020204030204" pitchFamily="49" charset="0"/>
+                <a:ea typeface="Calibri" panose="020F0502020204030204" pitchFamily="34" charset="0"/>
+                <a:cs typeface="Consolas" panose="020B0609020204030204" pitchFamily="49" charset="0"/>
+              </a:rPr>
+              <a:t>double</a:t>
+            </a:r>
+            <a:r>
+              <a:rPr lang="en-US" sz="1600" dirty="0">
+                <a:solidFill>
+                  <a:srgbClr val="000000"/>
+                </a:solidFill>
+                <a:latin typeface="Consolas" panose="020B0609020204030204" pitchFamily="49" charset="0"/>
+                <a:ea typeface="Calibri" panose="020F0502020204030204" pitchFamily="34" charset="0"/>
+                <a:cs typeface="Consolas" panose="020B0609020204030204" pitchFamily="49" charset="0"/>
+              </a:rPr>
+              <a:t> x, </a:t>
+            </a:r>
+            <a:r>
+              <a:rPr lang="en-US" sz="1600" dirty="0">
+                <a:solidFill>
+                  <a:srgbClr val="0000FF"/>
+                </a:solidFill>
+                <a:latin typeface="Consolas" panose="020B0609020204030204" pitchFamily="49" charset="0"/>
+                <a:ea typeface="Calibri" panose="020F0502020204030204" pitchFamily="34" charset="0"/>
+                <a:cs typeface="Consolas" panose="020B0609020204030204" pitchFamily="49" charset="0"/>
+              </a:rPr>
+              <a:t>double</a:t>
+            </a:r>
+            <a:r>
+              <a:rPr lang="en-US" sz="1600" dirty="0">
+                <a:solidFill>
+                  <a:srgbClr val="000000"/>
+                </a:solidFill>
+                <a:latin typeface="Consolas" panose="020B0609020204030204" pitchFamily="49" charset="0"/>
+                <a:ea typeface="Calibri" panose="020F0502020204030204" pitchFamily="34" charset="0"/>
+                <a:cs typeface="Consolas" panose="020B0609020204030204" pitchFamily="49" charset="0"/>
+              </a:rPr>
+              <a:t> y)</a:t>
+            </a:r>
+            <a:endParaRPr lang="en-US" sz="1600" dirty="0">
+              <a:latin typeface="Consolas" panose="020B0609020204030204" pitchFamily="49" charset="0"/>
+              <a:ea typeface="Calibri" panose="020F0502020204030204" pitchFamily="34" charset="0"/>
+              <a:cs typeface="Consolas" panose="020B0609020204030204" pitchFamily="49" charset="0"/>
+            </a:endParaRPr>
+          </a:p>
+          <a:p>
+            <a:pPr marL="0" marR="0" indent="0">
+              <a:lnSpc>
+                <a:spcPct val="107000"/>
+              </a:lnSpc>
+              <a:spcBef>
+                <a:spcPts val="0"/>
+              </a:spcBef>
+              <a:spcAft>
+                <a:spcPts val="0"/>
+              </a:spcAft>
+              <a:buNone/>
+            </a:pPr>
+            <a:r>
+              <a:rPr lang="en-US" sz="1600" dirty="0" smtClean="0">
+                <a:solidFill>
+                  <a:srgbClr val="000000"/>
+                </a:solidFill>
+                <a:latin typeface="Consolas" panose="020B0609020204030204" pitchFamily="49" charset="0"/>
+                <a:ea typeface="Calibri" panose="020F0502020204030204" pitchFamily="34" charset="0"/>
+                <a:cs typeface="Consolas" panose="020B0609020204030204" pitchFamily="49" charset="0"/>
+              </a:rPr>
+              <a:t>  </a:t>
+            </a:r>
+            <a:r>
+              <a:rPr lang="en-US" sz="1600" dirty="0">
+                <a:solidFill>
+                  <a:srgbClr val="000000"/>
+                </a:solidFill>
+                <a:latin typeface="Consolas" panose="020B0609020204030204" pitchFamily="49" charset="0"/>
+                <a:ea typeface="Calibri" panose="020F0502020204030204" pitchFamily="34" charset="0"/>
+                <a:cs typeface="Consolas" panose="020B0609020204030204" pitchFamily="49" charset="0"/>
+              </a:rPr>
+              <a:t>{</a:t>
+            </a:r>
+            <a:endParaRPr lang="en-US" sz="1600" dirty="0">
+              <a:latin typeface="Consolas" panose="020B0609020204030204" pitchFamily="49" charset="0"/>
+              <a:ea typeface="Calibri" panose="020F0502020204030204" pitchFamily="34" charset="0"/>
+              <a:cs typeface="Consolas" panose="020B0609020204030204" pitchFamily="49" charset="0"/>
+            </a:endParaRPr>
+          </a:p>
+          <a:p>
+            <a:pPr marL="0" marR="0" indent="0">
+              <a:lnSpc>
+                <a:spcPct val="107000"/>
+              </a:lnSpc>
+              <a:spcBef>
+                <a:spcPts val="0"/>
+              </a:spcBef>
+              <a:spcAft>
+                <a:spcPts val="0"/>
+              </a:spcAft>
+              <a:buNone/>
+            </a:pPr>
+            <a:r>
+              <a:rPr lang="en-US" sz="1600" dirty="0" smtClean="0">
+                <a:solidFill>
+                  <a:srgbClr val="000000"/>
+                </a:solidFill>
+                <a:latin typeface="Consolas" panose="020B0609020204030204" pitchFamily="49" charset="0"/>
+                <a:ea typeface="Calibri" panose="020F0502020204030204" pitchFamily="34" charset="0"/>
+                <a:cs typeface="Consolas" panose="020B0609020204030204" pitchFamily="49" charset="0"/>
+              </a:rPr>
+              <a:t>    </a:t>
+            </a:r>
+            <a:r>
+              <a:rPr lang="en-US" sz="1600" dirty="0">
+                <a:solidFill>
+                  <a:srgbClr val="000000"/>
+                </a:solidFill>
+                <a:latin typeface="Consolas" panose="020B0609020204030204" pitchFamily="49" charset="0"/>
+                <a:ea typeface="Calibri" panose="020F0502020204030204" pitchFamily="34" charset="0"/>
+                <a:cs typeface="Consolas" panose="020B0609020204030204" pitchFamily="49" charset="0"/>
+              </a:rPr>
+              <a:t>X = x;</a:t>
+            </a:r>
+            <a:endParaRPr lang="en-US" sz="1600" dirty="0">
+              <a:latin typeface="Consolas" panose="020B0609020204030204" pitchFamily="49" charset="0"/>
+              <a:ea typeface="Calibri" panose="020F0502020204030204" pitchFamily="34" charset="0"/>
+              <a:cs typeface="Consolas" panose="020B0609020204030204" pitchFamily="49" charset="0"/>
+            </a:endParaRPr>
+          </a:p>
+          <a:p>
+            <a:pPr marL="0" marR="0" indent="0">
+              <a:lnSpc>
+                <a:spcPct val="107000"/>
+              </a:lnSpc>
+              <a:spcBef>
+                <a:spcPts val="0"/>
+              </a:spcBef>
+              <a:spcAft>
+                <a:spcPts val="0"/>
+              </a:spcAft>
+              <a:buNone/>
+            </a:pPr>
+            <a:r>
+              <a:rPr lang="en-US" sz="1600" dirty="0" smtClean="0">
+                <a:solidFill>
+                  <a:srgbClr val="000000"/>
+                </a:solidFill>
+                <a:latin typeface="Consolas" panose="020B0609020204030204" pitchFamily="49" charset="0"/>
+                <a:ea typeface="Calibri" panose="020F0502020204030204" pitchFamily="34" charset="0"/>
+                <a:cs typeface="Consolas" panose="020B0609020204030204" pitchFamily="49" charset="0"/>
+              </a:rPr>
+              <a:t>    </a:t>
+            </a:r>
+            <a:r>
+              <a:rPr lang="en-US" sz="1600" dirty="0">
+                <a:solidFill>
+                  <a:srgbClr val="000000"/>
+                </a:solidFill>
+                <a:latin typeface="Consolas" panose="020B0609020204030204" pitchFamily="49" charset="0"/>
+                <a:ea typeface="Calibri" panose="020F0502020204030204" pitchFamily="34" charset="0"/>
+                <a:cs typeface="Consolas" panose="020B0609020204030204" pitchFamily="49" charset="0"/>
+              </a:rPr>
+              <a:t>Y = y;</a:t>
+            </a:r>
+            <a:endParaRPr lang="en-US" sz="1600" dirty="0">
+              <a:latin typeface="Consolas" panose="020B0609020204030204" pitchFamily="49" charset="0"/>
+              <a:ea typeface="Calibri" panose="020F0502020204030204" pitchFamily="34" charset="0"/>
+              <a:cs typeface="Consolas" panose="020B0609020204030204" pitchFamily="49" charset="0"/>
+            </a:endParaRPr>
+          </a:p>
+          <a:p>
+            <a:pPr marL="0" marR="0" indent="0">
+              <a:lnSpc>
+                <a:spcPct val="107000"/>
+              </a:lnSpc>
+              <a:spcBef>
+                <a:spcPts val="0"/>
+              </a:spcBef>
+              <a:spcAft>
+                <a:spcPts val="0"/>
+              </a:spcAft>
+              <a:buNone/>
+            </a:pPr>
+            <a:r>
+              <a:rPr lang="en-US" sz="1600" dirty="0" smtClean="0">
+                <a:solidFill>
+                  <a:srgbClr val="000000"/>
+                </a:solidFill>
+                <a:latin typeface="Consolas" panose="020B0609020204030204" pitchFamily="49" charset="0"/>
+                <a:ea typeface="Calibri" panose="020F0502020204030204" pitchFamily="34" charset="0"/>
+                <a:cs typeface="Consolas" panose="020B0609020204030204" pitchFamily="49" charset="0"/>
+              </a:rPr>
+              <a:t>  </a:t>
+            </a:r>
+            <a:r>
+              <a:rPr lang="en-US" sz="1600" dirty="0">
+                <a:solidFill>
+                  <a:srgbClr val="000000"/>
+                </a:solidFill>
+                <a:latin typeface="Consolas" panose="020B0609020204030204" pitchFamily="49" charset="0"/>
+                <a:ea typeface="Calibri" panose="020F0502020204030204" pitchFamily="34" charset="0"/>
+                <a:cs typeface="Consolas" panose="020B0609020204030204" pitchFamily="49" charset="0"/>
+              </a:rPr>
+              <a:t>}</a:t>
+            </a:r>
+            <a:endParaRPr lang="en-US" sz="1600" dirty="0">
+              <a:latin typeface="Consolas" panose="020B0609020204030204" pitchFamily="49" charset="0"/>
+              <a:ea typeface="Calibri" panose="020F0502020204030204" pitchFamily="34" charset="0"/>
+              <a:cs typeface="Consolas" panose="020B0609020204030204" pitchFamily="49" charset="0"/>
+            </a:endParaRPr>
+          </a:p>
+          <a:p>
+            <a:pPr marL="0" marR="0" indent="0">
+              <a:lnSpc>
+                <a:spcPct val="107000"/>
+              </a:lnSpc>
+              <a:spcBef>
+                <a:spcPts val="0"/>
+              </a:spcBef>
+              <a:spcAft>
+                <a:spcPts val="0"/>
+              </a:spcAft>
+              <a:buNone/>
+            </a:pPr>
+            <a:r>
+              <a:rPr lang="en-US" sz="1600" dirty="0" smtClean="0">
+                <a:solidFill>
+                  <a:srgbClr val="000000"/>
+                </a:solidFill>
+                <a:latin typeface="Consolas" panose="020B0609020204030204" pitchFamily="49" charset="0"/>
+                <a:ea typeface="Calibri" panose="020F0502020204030204" pitchFamily="34" charset="0"/>
+                <a:cs typeface="Consolas" panose="020B0609020204030204" pitchFamily="49" charset="0"/>
+              </a:rPr>
+              <a:t>  </a:t>
+            </a:r>
+            <a:r>
+              <a:rPr lang="en-US" sz="1600" dirty="0">
+                <a:solidFill>
+                  <a:srgbClr val="0000FF"/>
+                </a:solidFill>
+                <a:latin typeface="Consolas" panose="020B0609020204030204" pitchFamily="49" charset="0"/>
+                <a:ea typeface="Calibri" panose="020F0502020204030204" pitchFamily="34" charset="0"/>
+                <a:cs typeface="Consolas" panose="020B0609020204030204" pitchFamily="49" charset="0"/>
+              </a:rPr>
+              <a:t>public</a:t>
+            </a:r>
+            <a:r>
+              <a:rPr lang="en-US" sz="1600" dirty="0">
+                <a:solidFill>
+                  <a:srgbClr val="000000"/>
+                </a:solidFill>
+                <a:latin typeface="Consolas" panose="020B0609020204030204" pitchFamily="49" charset="0"/>
+                <a:ea typeface="Calibri" panose="020F0502020204030204" pitchFamily="34" charset="0"/>
+                <a:cs typeface="Consolas" panose="020B0609020204030204" pitchFamily="49" charset="0"/>
+              </a:rPr>
+              <a:t> </a:t>
+            </a:r>
+            <a:r>
+              <a:rPr lang="en-US" sz="1600" dirty="0">
+                <a:solidFill>
+                  <a:srgbClr val="0000FF"/>
+                </a:solidFill>
+                <a:latin typeface="Consolas" panose="020B0609020204030204" pitchFamily="49" charset="0"/>
+                <a:ea typeface="Calibri" panose="020F0502020204030204" pitchFamily="34" charset="0"/>
+                <a:cs typeface="Consolas" panose="020B0609020204030204" pitchFamily="49" charset="0"/>
+              </a:rPr>
+              <a:t>double</a:t>
+            </a:r>
+            <a:r>
+              <a:rPr lang="en-US" sz="1600" dirty="0">
+                <a:solidFill>
+                  <a:srgbClr val="000000"/>
+                </a:solidFill>
+                <a:latin typeface="Consolas" panose="020B0609020204030204" pitchFamily="49" charset="0"/>
+                <a:ea typeface="Calibri" panose="020F0502020204030204" pitchFamily="34" charset="0"/>
+                <a:cs typeface="Consolas" panose="020B0609020204030204" pitchFamily="49" charset="0"/>
+              </a:rPr>
+              <a:t> X { </a:t>
+            </a:r>
+            <a:r>
+              <a:rPr lang="en-US" sz="1600" dirty="0">
+                <a:solidFill>
+                  <a:srgbClr val="0000FF"/>
+                </a:solidFill>
+                <a:latin typeface="Consolas" panose="020B0609020204030204" pitchFamily="49" charset="0"/>
+                <a:ea typeface="Calibri" panose="020F0502020204030204" pitchFamily="34" charset="0"/>
+                <a:cs typeface="Consolas" panose="020B0609020204030204" pitchFamily="49" charset="0"/>
+              </a:rPr>
+              <a:t>get</a:t>
+            </a:r>
+            <a:r>
+              <a:rPr lang="en-US" sz="1600" dirty="0">
+                <a:solidFill>
+                  <a:srgbClr val="000000"/>
+                </a:solidFill>
+                <a:latin typeface="Consolas" panose="020B0609020204030204" pitchFamily="49" charset="0"/>
+                <a:ea typeface="Calibri" panose="020F0502020204030204" pitchFamily="34" charset="0"/>
+                <a:cs typeface="Consolas" panose="020B0609020204030204" pitchFamily="49" charset="0"/>
+              </a:rPr>
+              <a:t>; }</a:t>
+            </a:r>
+            <a:endParaRPr lang="en-US" sz="1600" dirty="0">
+              <a:latin typeface="Consolas" panose="020B0609020204030204" pitchFamily="49" charset="0"/>
+              <a:ea typeface="Calibri" panose="020F0502020204030204" pitchFamily="34" charset="0"/>
+              <a:cs typeface="Consolas" panose="020B0609020204030204" pitchFamily="49" charset="0"/>
+            </a:endParaRPr>
+          </a:p>
+          <a:p>
+            <a:pPr marL="0" marR="0" indent="0">
+              <a:lnSpc>
+                <a:spcPct val="107000"/>
+              </a:lnSpc>
+              <a:spcBef>
+                <a:spcPts val="0"/>
+              </a:spcBef>
+              <a:spcAft>
+                <a:spcPts val="0"/>
+              </a:spcAft>
+              <a:buNone/>
+            </a:pPr>
+            <a:r>
+              <a:rPr lang="en-US" sz="1600" dirty="0" smtClean="0">
+                <a:solidFill>
+                  <a:srgbClr val="000000"/>
+                </a:solidFill>
+                <a:latin typeface="Consolas" panose="020B0609020204030204" pitchFamily="49" charset="0"/>
+                <a:ea typeface="Calibri" panose="020F0502020204030204" pitchFamily="34" charset="0"/>
+                <a:cs typeface="Consolas" panose="020B0609020204030204" pitchFamily="49" charset="0"/>
+              </a:rPr>
+              <a:t>  </a:t>
+            </a:r>
+            <a:r>
+              <a:rPr lang="en-US" sz="1600" dirty="0">
+                <a:solidFill>
+                  <a:srgbClr val="0000FF"/>
+                </a:solidFill>
+                <a:latin typeface="Consolas" panose="020B0609020204030204" pitchFamily="49" charset="0"/>
+                <a:ea typeface="Calibri" panose="020F0502020204030204" pitchFamily="34" charset="0"/>
+                <a:cs typeface="Consolas" panose="020B0609020204030204" pitchFamily="49" charset="0"/>
+              </a:rPr>
+              <a:t>public</a:t>
+            </a:r>
+            <a:r>
+              <a:rPr lang="en-US" sz="1600" dirty="0">
+                <a:solidFill>
+                  <a:srgbClr val="000000"/>
+                </a:solidFill>
+                <a:latin typeface="Consolas" panose="020B0609020204030204" pitchFamily="49" charset="0"/>
+                <a:ea typeface="Calibri" panose="020F0502020204030204" pitchFamily="34" charset="0"/>
+                <a:cs typeface="Consolas" panose="020B0609020204030204" pitchFamily="49" charset="0"/>
+              </a:rPr>
+              <a:t> </a:t>
+            </a:r>
+            <a:r>
+              <a:rPr lang="en-US" sz="1600" dirty="0">
+                <a:solidFill>
+                  <a:srgbClr val="0000FF"/>
+                </a:solidFill>
+                <a:latin typeface="Consolas" panose="020B0609020204030204" pitchFamily="49" charset="0"/>
+                <a:ea typeface="Calibri" panose="020F0502020204030204" pitchFamily="34" charset="0"/>
+                <a:cs typeface="Consolas" panose="020B0609020204030204" pitchFamily="49" charset="0"/>
+              </a:rPr>
+              <a:t>double</a:t>
+            </a:r>
+            <a:r>
+              <a:rPr lang="en-US" sz="1600" dirty="0">
+                <a:solidFill>
+                  <a:srgbClr val="000000"/>
+                </a:solidFill>
+                <a:latin typeface="Consolas" panose="020B0609020204030204" pitchFamily="49" charset="0"/>
+                <a:ea typeface="Calibri" panose="020F0502020204030204" pitchFamily="34" charset="0"/>
+                <a:cs typeface="Consolas" panose="020B0609020204030204" pitchFamily="49" charset="0"/>
+              </a:rPr>
+              <a:t> Y { </a:t>
+            </a:r>
+            <a:r>
+              <a:rPr lang="en-US" sz="1600" dirty="0">
+                <a:solidFill>
+                  <a:srgbClr val="0000FF"/>
+                </a:solidFill>
+                <a:latin typeface="Consolas" panose="020B0609020204030204" pitchFamily="49" charset="0"/>
+                <a:ea typeface="Calibri" panose="020F0502020204030204" pitchFamily="34" charset="0"/>
+                <a:cs typeface="Consolas" panose="020B0609020204030204" pitchFamily="49" charset="0"/>
+              </a:rPr>
+              <a:t>get</a:t>
+            </a:r>
+            <a:r>
+              <a:rPr lang="en-US" sz="1600" dirty="0">
+                <a:solidFill>
+                  <a:srgbClr val="000000"/>
+                </a:solidFill>
+                <a:latin typeface="Consolas" panose="020B0609020204030204" pitchFamily="49" charset="0"/>
+                <a:ea typeface="Calibri" panose="020F0502020204030204" pitchFamily="34" charset="0"/>
+                <a:cs typeface="Consolas" panose="020B0609020204030204" pitchFamily="49" charset="0"/>
+              </a:rPr>
+              <a:t>; }</a:t>
+            </a:r>
+            <a:endParaRPr lang="en-US" sz="1600" dirty="0">
+              <a:latin typeface="Consolas" panose="020B0609020204030204" pitchFamily="49" charset="0"/>
+              <a:ea typeface="Calibri" panose="020F0502020204030204" pitchFamily="34" charset="0"/>
+              <a:cs typeface="Consolas" panose="020B0609020204030204" pitchFamily="49" charset="0"/>
+            </a:endParaRPr>
+          </a:p>
+          <a:p>
+            <a:pPr marL="0" marR="0" indent="0">
+              <a:lnSpc>
+                <a:spcPct val="107000"/>
+              </a:lnSpc>
+              <a:spcBef>
+                <a:spcPts val="0"/>
+              </a:spcBef>
+              <a:spcAft>
+                <a:spcPts val="0"/>
+              </a:spcAft>
+              <a:buNone/>
+            </a:pPr>
+            <a:r>
+              <a:rPr lang="en-US" sz="1600" dirty="0" smtClean="0">
+                <a:solidFill>
+                  <a:srgbClr val="000000"/>
+                </a:solidFill>
+                <a:latin typeface="Consolas" panose="020B0609020204030204" pitchFamily="49" charset="0"/>
+                <a:ea typeface="Calibri" panose="020F0502020204030204" pitchFamily="34" charset="0"/>
+                <a:cs typeface="Consolas" panose="020B0609020204030204" pitchFamily="49" charset="0"/>
+              </a:rPr>
+              <a:t>}</a:t>
+            </a:r>
+            <a:endParaRPr lang="en-US" sz="1600" dirty="0">
+              <a:effectLst/>
+              <a:latin typeface="Consolas" panose="020B0609020204030204" pitchFamily="49" charset="0"/>
+              <a:ea typeface="Calibri" panose="020F0502020204030204" pitchFamily="34" charset="0"/>
+              <a:cs typeface="Consolas" panose="020B0609020204030204" pitchFamily="49" charset="0"/>
+            </a:endParaRPr>
+          </a:p>
+        </p:txBody>
+      </p:sp>
+      <p:sp>
+        <p:nvSpPr>
+          <p:cNvPr id="8" name="Content Placeholder 5"/>
+          <p:cNvSpPr>
+            <a:spLocks noGrp="1"/>
+          </p:cNvSpPr>
+          <p:nvPr>
+            <p:ph sz="quarter" idx="4294967295"/>
+          </p:nvPr>
+        </p:nvSpPr>
+        <p:spPr>
+          <a:xfrm>
+            <a:off x="2131697" y="4106333"/>
+            <a:ext cx="7924800" cy="1828800"/>
+          </a:xfrm>
+          <a:prstGeom prst="rect">
+            <a:avLst/>
+          </a:prstGeom>
+        </p:spPr>
+        <p:txBody>
+          <a:bodyPr>
+            <a:noAutofit/>
+          </a:bodyPr>
+          <a:lstStyle/>
+          <a:p>
+            <a:pPr marL="0" marR="0" indent="0">
+              <a:lnSpc>
+                <a:spcPct val="107000"/>
+              </a:lnSpc>
+              <a:spcBef>
+                <a:spcPts val="0"/>
+              </a:spcBef>
+              <a:spcAft>
+                <a:spcPts val="0"/>
+              </a:spcAft>
+              <a:buNone/>
+            </a:pPr>
+            <a:r>
+              <a:rPr lang="en-US" sz="1600" dirty="0" err="1">
+                <a:solidFill>
+                  <a:srgbClr val="0000FF"/>
+                </a:solidFill>
+                <a:latin typeface="Consolas" panose="020B0609020204030204" pitchFamily="49" charset="0"/>
+                <a:ea typeface="Calibri" panose="020F0502020204030204" pitchFamily="34" charset="0"/>
+                <a:cs typeface="Consolas" panose="020B0609020204030204" pitchFamily="49" charset="0"/>
+              </a:rPr>
+              <a:t>var</a:t>
+            </a:r>
+            <a:r>
+              <a:rPr lang="en-US" sz="1600" dirty="0">
+                <a:solidFill>
+                  <a:srgbClr val="000000"/>
+                </a:solidFill>
+                <a:latin typeface="Consolas" panose="020B0609020204030204" pitchFamily="49" charset="0"/>
+                <a:ea typeface="Calibri" panose="020F0502020204030204" pitchFamily="34" charset="0"/>
+                <a:cs typeface="Consolas" panose="020B0609020204030204" pitchFamily="49" charset="0"/>
+              </a:rPr>
+              <a:t> </a:t>
+            </a:r>
+            <a:r>
+              <a:rPr lang="en-US" sz="1600" dirty="0" err="1">
+                <a:solidFill>
+                  <a:srgbClr val="000000"/>
+                </a:solidFill>
+                <a:latin typeface="Consolas" panose="020B0609020204030204" pitchFamily="49" charset="0"/>
+                <a:ea typeface="Calibri" panose="020F0502020204030204" pitchFamily="34" charset="0"/>
+                <a:cs typeface="Consolas" panose="020B0609020204030204" pitchFamily="49" charset="0"/>
+              </a:rPr>
+              <a:t>webErrors</a:t>
+            </a:r>
+            <a:r>
+              <a:rPr lang="en-US" sz="1600" dirty="0">
+                <a:solidFill>
+                  <a:srgbClr val="000000"/>
+                </a:solidFill>
+                <a:latin typeface="Consolas" panose="020B0609020204030204" pitchFamily="49" charset="0"/>
+                <a:ea typeface="Calibri" panose="020F0502020204030204" pitchFamily="34" charset="0"/>
+                <a:cs typeface="Consolas" panose="020B0609020204030204" pitchFamily="49" charset="0"/>
+              </a:rPr>
+              <a:t> = </a:t>
+            </a:r>
+            <a:r>
+              <a:rPr lang="en-US" sz="1600" dirty="0">
+                <a:solidFill>
+                  <a:srgbClr val="0000FF"/>
+                </a:solidFill>
+                <a:latin typeface="Consolas" panose="020B0609020204030204" pitchFamily="49" charset="0"/>
+                <a:ea typeface="Calibri" panose="020F0502020204030204" pitchFamily="34" charset="0"/>
+                <a:cs typeface="Consolas" panose="020B0609020204030204" pitchFamily="49" charset="0"/>
+              </a:rPr>
+              <a:t>new</a:t>
+            </a:r>
+            <a:r>
+              <a:rPr lang="en-US" sz="1600" dirty="0">
+                <a:solidFill>
+                  <a:srgbClr val="000000"/>
+                </a:solidFill>
+                <a:latin typeface="Consolas" panose="020B0609020204030204" pitchFamily="49" charset="0"/>
+                <a:ea typeface="Calibri" panose="020F0502020204030204" pitchFamily="34" charset="0"/>
+                <a:cs typeface="Consolas" panose="020B0609020204030204" pitchFamily="49" charset="0"/>
+              </a:rPr>
+              <a:t> </a:t>
+            </a:r>
+            <a:r>
+              <a:rPr lang="en-US" sz="1600" dirty="0">
+                <a:solidFill>
+                  <a:srgbClr val="2B91AF"/>
+                </a:solidFill>
+                <a:latin typeface="Consolas" panose="020B0609020204030204" pitchFamily="49" charset="0"/>
+                <a:ea typeface="Calibri" panose="020F0502020204030204" pitchFamily="34" charset="0"/>
+                <a:cs typeface="Consolas" panose="020B0609020204030204" pitchFamily="49" charset="0"/>
+              </a:rPr>
+              <a:t>Dictionary</a:t>
+            </a:r>
+            <a:r>
+              <a:rPr lang="en-US" sz="1600" dirty="0">
+                <a:solidFill>
+                  <a:srgbClr val="000000"/>
+                </a:solidFill>
+                <a:latin typeface="Consolas" panose="020B0609020204030204" pitchFamily="49" charset="0"/>
+                <a:ea typeface="Calibri" panose="020F0502020204030204" pitchFamily="34" charset="0"/>
+                <a:cs typeface="Consolas" panose="020B0609020204030204" pitchFamily="49" charset="0"/>
+              </a:rPr>
+              <a:t>&lt;</a:t>
+            </a:r>
+            <a:r>
+              <a:rPr lang="en-US" sz="1600" dirty="0" err="1">
+                <a:solidFill>
+                  <a:srgbClr val="0000FF"/>
+                </a:solidFill>
+                <a:latin typeface="Consolas" panose="020B0609020204030204" pitchFamily="49" charset="0"/>
+                <a:ea typeface="Calibri" panose="020F0502020204030204" pitchFamily="34" charset="0"/>
+                <a:cs typeface="Consolas" panose="020B0609020204030204" pitchFamily="49" charset="0"/>
+              </a:rPr>
+              <a:t>int</a:t>
+            </a:r>
+            <a:r>
+              <a:rPr lang="en-US" sz="1600" dirty="0">
+                <a:solidFill>
+                  <a:srgbClr val="000000"/>
+                </a:solidFill>
+                <a:latin typeface="Consolas" panose="020B0609020204030204" pitchFamily="49" charset="0"/>
+                <a:ea typeface="Calibri" panose="020F0502020204030204" pitchFamily="34" charset="0"/>
+                <a:cs typeface="Consolas" panose="020B0609020204030204" pitchFamily="49" charset="0"/>
+              </a:rPr>
+              <a:t>, </a:t>
+            </a:r>
+            <a:r>
+              <a:rPr lang="en-US" sz="1600" dirty="0">
+                <a:solidFill>
+                  <a:srgbClr val="0000FF"/>
+                </a:solidFill>
+                <a:latin typeface="Consolas" panose="020B0609020204030204" pitchFamily="49" charset="0"/>
+                <a:ea typeface="Calibri" panose="020F0502020204030204" pitchFamily="34" charset="0"/>
+                <a:cs typeface="Consolas" panose="020B0609020204030204" pitchFamily="49" charset="0"/>
+              </a:rPr>
+              <a:t>string</a:t>
+            </a:r>
+            <a:r>
+              <a:rPr lang="en-US" sz="1600" dirty="0">
+                <a:solidFill>
+                  <a:srgbClr val="000000"/>
+                </a:solidFill>
+                <a:latin typeface="Consolas" panose="020B0609020204030204" pitchFamily="49" charset="0"/>
+                <a:ea typeface="Calibri" panose="020F0502020204030204" pitchFamily="34" charset="0"/>
+                <a:cs typeface="Consolas" panose="020B0609020204030204" pitchFamily="49" charset="0"/>
+              </a:rPr>
+              <a:t>&gt;</a:t>
+            </a:r>
+            <a:endParaRPr lang="en-US" sz="1600" dirty="0">
+              <a:latin typeface="Consolas" panose="020B0609020204030204" pitchFamily="49" charset="0"/>
+              <a:ea typeface="Calibri" panose="020F0502020204030204" pitchFamily="34" charset="0"/>
+              <a:cs typeface="Consolas" panose="020B0609020204030204" pitchFamily="49" charset="0"/>
+            </a:endParaRPr>
+          </a:p>
+          <a:p>
+            <a:pPr marL="0" marR="0" indent="0">
+              <a:lnSpc>
+                <a:spcPct val="107000"/>
+              </a:lnSpc>
+              <a:spcBef>
+                <a:spcPts val="0"/>
+              </a:spcBef>
+              <a:spcAft>
+                <a:spcPts val="0"/>
+              </a:spcAft>
+              <a:buNone/>
+            </a:pPr>
+            <a:r>
+              <a:rPr lang="en-US" sz="1600" dirty="0">
+                <a:solidFill>
+                  <a:srgbClr val="000000"/>
+                </a:solidFill>
+                <a:latin typeface="Consolas" panose="020B0609020204030204" pitchFamily="49" charset="0"/>
+                <a:ea typeface="Calibri" panose="020F0502020204030204" pitchFamily="34" charset="0"/>
+                <a:cs typeface="Consolas" panose="020B0609020204030204" pitchFamily="49" charset="0"/>
+              </a:rPr>
+              <a:t>{</a:t>
+            </a:r>
+            <a:endParaRPr lang="en-US" sz="1600" dirty="0">
+              <a:latin typeface="Consolas" panose="020B0609020204030204" pitchFamily="49" charset="0"/>
+              <a:ea typeface="Calibri" panose="020F0502020204030204" pitchFamily="34" charset="0"/>
+              <a:cs typeface="Consolas" panose="020B0609020204030204" pitchFamily="49" charset="0"/>
+            </a:endParaRPr>
+          </a:p>
+          <a:p>
+            <a:pPr marL="0" marR="0" indent="0">
+              <a:lnSpc>
+                <a:spcPct val="107000"/>
+              </a:lnSpc>
+              <a:spcBef>
+                <a:spcPts val="0"/>
+              </a:spcBef>
+              <a:spcAft>
+                <a:spcPts val="0"/>
+              </a:spcAft>
+              <a:buNone/>
+            </a:pPr>
+            <a:r>
+              <a:rPr lang="en-US" sz="1600" dirty="0">
+                <a:solidFill>
+                  <a:srgbClr val="000000"/>
+                </a:solidFill>
+                <a:latin typeface="Consolas" panose="020B0609020204030204" pitchFamily="49" charset="0"/>
+                <a:ea typeface="Calibri" panose="020F0502020204030204" pitchFamily="34" charset="0"/>
+                <a:cs typeface="Consolas" panose="020B0609020204030204" pitchFamily="49" charset="0"/>
+              </a:rPr>
+              <a:t>    [404] = </a:t>
+            </a:r>
+            <a:r>
+              <a:rPr lang="en-US" sz="1600" dirty="0">
+                <a:solidFill>
+                  <a:srgbClr val="A31515"/>
+                </a:solidFill>
+                <a:latin typeface="Consolas" panose="020B0609020204030204" pitchFamily="49" charset="0"/>
+                <a:ea typeface="Calibri" panose="020F0502020204030204" pitchFamily="34" charset="0"/>
+                <a:cs typeface="Consolas" panose="020B0609020204030204" pitchFamily="49" charset="0"/>
+              </a:rPr>
+              <a:t>"Page not Found"</a:t>
+            </a:r>
+            <a:r>
+              <a:rPr lang="en-US" sz="1600" dirty="0">
+                <a:solidFill>
+                  <a:srgbClr val="000000"/>
+                </a:solidFill>
+                <a:latin typeface="Consolas" panose="020B0609020204030204" pitchFamily="49" charset="0"/>
+                <a:ea typeface="Calibri" panose="020F0502020204030204" pitchFamily="34" charset="0"/>
+                <a:cs typeface="Consolas" panose="020B0609020204030204" pitchFamily="49" charset="0"/>
+              </a:rPr>
+              <a:t>,</a:t>
+            </a:r>
+            <a:endParaRPr lang="en-US" sz="1600" dirty="0">
+              <a:latin typeface="Consolas" panose="020B0609020204030204" pitchFamily="49" charset="0"/>
+              <a:ea typeface="Calibri" panose="020F0502020204030204" pitchFamily="34" charset="0"/>
+              <a:cs typeface="Consolas" panose="020B0609020204030204" pitchFamily="49" charset="0"/>
+            </a:endParaRPr>
+          </a:p>
+          <a:p>
+            <a:pPr marL="0" marR="0" indent="0">
+              <a:lnSpc>
+                <a:spcPct val="107000"/>
+              </a:lnSpc>
+              <a:spcBef>
+                <a:spcPts val="0"/>
+              </a:spcBef>
+              <a:spcAft>
+                <a:spcPts val="0"/>
+              </a:spcAft>
+              <a:buNone/>
+            </a:pPr>
+            <a:r>
+              <a:rPr lang="en-US" sz="1600" dirty="0">
+                <a:solidFill>
+                  <a:srgbClr val="000000"/>
+                </a:solidFill>
+                <a:latin typeface="Consolas" panose="020B0609020204030204" pitchFamily="49" charset="0"/>
+                <a:ea typeface="Calibri" panose="020F0502020204030204" pitchFamily="34" charset="0"/>
+                <a:cs typeface="Consolas" panose="020B0609020204030204" pitchFamily="49" charset="0"/>
+              </a:rPr>
+              <a:t>    [302] = </a:t>
+            </a:r>
+            <a:r>
+              <a:rPr lang="en-US" sz="1600" dirty="0">
+                <a:solidFill>
+                  <a:srgbClr val="A31515"/>
+                </a:solidFill>
+                <a:latin typeface="Consolas" panose="020B0609020204030204" pitchFamily="49" charset="0"/>
+                <a:ea typeface="Calibri" panose="020F0502020204030204" pitchFamily="34" charset="0"/>
+                <a:cs typeface="Consolas" panose="020B0609020204030204" pitchFamily="49" charset="0"/>
+              </a:rPr>
+              <a:t>"Page moved, but left a forwarding address."</a:t>
+            </a:r>
+            <a:r>
+              <a:rPr lang="en-US" sz="1600" dirty="0">
+                <a:solidFill>
+                  <a:srgbClr val="000000"/>
+                </a:solidFill>
+                <a:latin typeface="Consolas" panose="020B0609020204030204" pitchFamily="49" charset="0"/>
+                <a:ea typeface="Calibri" panose="020F0502020204030204" pitchFamily="34" charset="0"/>
+                <a:cs typeface="Consolas" panose="020B0609020204030204" pitchFamily="49" charset="0"/>
+              </a:rPr>
+              <a:t>,</a:t>
+            </a:r>
+            <a:endParaRPr lang="en-US" sz="1600" dirty="0">
+              <a:latin typeface="Consolas" panose="020B0609020204030204" pitchFamily="49" charset="0"/>
+              <a:ea typeface="Calibri" panose="020F0502020204030204" pitchFamily="34" charset="0"/>
+              <a:cs typeface="Consolas" panose="020B0609020204030204" pitchFamily="49" charset="0"/>
+            </a:endParaRPr>
+          </a:p>
+          <a:p>
+            <a:pPr marL="0" marR="0" indent="0">
+              <a:lnSpc>
+                <a:spcPct val="107000"/>
+              </a:lnSpc>
+              <a:spcBef>
+                <a:spcPts val="0"/>
+              </a:spcBef>
+              <a:spcAft>
+                <a:spcPts val="0"/>
+              </a:spcAft>
+              <a:buNone/>
+            </a:pPr>
+            <a:r>
+              <a:rPr lang="en-US" sz="1600" dirty="0">
+                <a:solidFill>
+                  <a:srgbClr val="000000"/>
+                </a:solidFill>
+                <a:latin typeface="Consolas" panose="020B0609020204030204" pitchFamily="49" charset="0"/>
+                <a:ea typeface="Calibri" panose="020F0502020204030204" pitchFamily="34" charset="0"/>
+                <a:cs typeface="Consolas" panose="020B0609020204030204" pitchFamily="49" charset="0"/>
+              </a:rPr>
+              <a:t>    [500] = </a:t>
+            </a:r>
+            <a:r>
+              <a:rPr lang="en-US" sz="1600" dirty="0">
+                <a:solidFill>
+                  <a:srgbClr val="A31515"/>
+                </a:solidFill>
+                <a:latin typeface="Consolas" panose="020B0609020204030204" pitchFamily="49" charset="0"/>
+                <a:ea typeface="Calibri" panose="020F0502020204030204" pitchFamily="34" charset="0"/>
+                <a:cs typeface="Consolas" panose="020B0609020204030204" pitchFamily="49" charset="0"/>
+              </a:rPr>
+              <a:t>"The web server can't come out to play today."</a:t>
+            </a:r>
+            <a:endParaRPr lang="en-US" sz="1600" dirty="0">
+              <a:latin typeface="Consolas" panose="020B0609020204030204" pitchFamily="49" charset="0"/>
+              <a:ea typeface="Calibri" panose="020F0502020204030204" pitchFamily="34" charset="0"/>
+              <a:cs typeface="Consolas" panose="020B0609020204030204" pitchFamily="49" charset="0"/>
+            </a:endParaRPr>
+          </a:p>
+          <a:p>
+            <a:pPr marL="0" marR="0" indent="0">
+              <a:lnSpc>
+                <a:spcPct val="107000"/>
+              </a:lnSpc>
+              <a:spcBef>
+                <a:spcPts val="0"/>
+              </a:spcBef>
+              <a:spcAft>
+                <a:spcPts val="0"/>
+              </a:spcAft>
+              <a:buNone/>
+            </a:pPr>
+            <a:r>
+              <a:rPr lang="en-US" sz="1600" dirty="0">
+                <a:solidFill>
+                  <a:srgbClr val="000000"/>
+                </a:solidFill>
+                <a:latin typeface="Consolas" panose="020B0609020204030204" pitchFamily="49" charset="0"/>
+                <a:ea typeface="Calibri" panose="020F0502020204030204" pitchFamily="34" charset="0"/>
+                <a:cs typeface="Consolas" panose="020B0609020204030204" pitchFamily="49" charset="0"/>
+              </a:rPr>
+              <a:t>};</a:t>
+            </a:r>
+            <a:endParaRPr lang="en-US" sz="1600" dirty="0">
+              <a:effectLst/>
+              <a:latin typeface="Consolas" panose="020B0609020204030204" pitchFamily="49" charset="0"/>
+              <a:ea typeface="Calibri" panose="020F0502020204030204" pitchFamily="34" charset="0"/>
+              <a:cs typeface="Consolas" panose="020B0609020204030204" pitchFamily="49" charset="0"/>
+            </a:endParaRPr>
+          </a:p>
+        </p:txBody>
+      </p:sp>
+    </p:spTree>
+    <p:extLst>
+      <p:ext uri="{BB962C8B-B14F-4D97-AF65-F5344CB8AC3E}">
+        <p14:creationId xmlns:p14="http://schemas.microsoft.com/office/powerpoint/2010/main" val="1743676242"/>
+      </p:ext>
+    </p:extLst>
+  </p:cSld>
+  <p:clrMapOvr>
+    <a:masterClrMapping/>
+  </p:clrMapOvr>
+  <p:transition>
+    <p:fade/>
+  </p:transition>
+  <p:timing>
+    <p:tnLst>
+      <p:par>
+        <p:cTn id="1" dur="indefinite" restart="never" nodeType="tmRoot"/>
+      </p:par>
+    </p:tnLst>
+  </p:timing>
+</p:sld>
+</file>
+
+<file path=ppt/slides/slide14.xml><?xml version="1.0" encoding="utf-8"?>
 <p:sld xmlns:a="http://schemas.openxmlformats.org/drawingml/2006/main" xmlns:r="http://schemas.openxmlformats.org/officeDocument/2006/relationships" xmlns:p="http://schemas.openxmlformats.org/presentationml/2006/main">
   <p:cSld>
     <p:spTree>

</xml_diff>